<commit_message>
adding backpack wearable demo
</commit_message>
<xml_diff>
--- a/src/img/_drafts/draft.pptx
+++ b/src/img/_drafts/draft.pptx
@@ -9,8 +9,10 @@
     <p:sldId id="257" r:id="rId3"/>
     <p:sldId id="258" r:id="rId4"/>
     <p:sldId id="259" r:id="rId5"/>
-    <p:sldId id="260" r:id="rId6"/>
-    <p:sldId id="261" r:id="rId7"/>
+    <p:sldId id="261" r:id="rId6"/>
+    <p:sldId id="260" r:id="rId7"/>
+    <p:sldId id="262" r:id="rId8"/>
+    <p:sldId id="263" r:id="rId9"/>
   </p:sldIdLst>
   <p:sldSz cx="12192000" cy="6858000"/>
   <p:notesSz cx="6858000" cy="9144000"/>
@@ -3896,7 +3898,7 @@
           <p:cNvPr id="5" name="Picture 4">
             <a:extLst>
               <a:ext uri="{FF2B5EF4-FFF2-40B4-BE49-F238E27FC236}">
-                <a16:creationId xmlns:a16="http://schemas.microsoft.com/office/drawing/2014/main" id="{296DA877-9218-4325-8A4C-BC6C0680B8CC}"/>
+                <a16:creationId xmlns:a16="http://schemas.microsoft.com/office/drawing/2014/main" id="{1CCF8380-D58D-409F-802C-39B7BCC472A7}"/>
               </a:ext>
             </a:extLst>
           </p:cNvPr>
@@ -3913,12 +3915,12 @@
               </a:ext>
             </a:extLst>
           </a:blip>
-          <a:srcRect l="15484" r="28182"/>
+          <a:srcRect l="21833" r="21833"/>
           <a:stretch/>
         </p:blipFill>
         <p:spPr>
           <a:xfrm>
-            <a:off x="2702378" y="209550"/>
+            <a:off x="2876550" y="209550"/>
             <a:ext cx="6438900" cy="6438900"/>
           </a:xfrm>
           <a:prstGeom prst="ellipse">
@@ -3929,7 +3931,7 @@
     </p:spTree>
     <p:extLst>
       <p:ext uri="{BB962C8B-B14F-4D97-AF65-F5344CB8AC3E}">
-        <p14:creationId xmlns:p14="http://schemas.microsoft.com/office/powerpoint/2010/main" val="461289751"/>
+        <p14:creationId xmlns:p14="http://schemas.microsoft.com/office/powerpoint/2010/main" val="1264807898"/>
       </p:ext>
     </p:extLst>
   </p:cSld>
@@ -3961,7 +3963,7 @@
           <p:cNvPr id="5" name="Picture 4">
             <a:extLst>
               <a:ext uri="{FF2B5EF4-FFF2-40B4-BE49-F238E27FC236}">
-                <a16:creationId xmlns:a16="http://schemas.microsoft.com/office/drawing/2014/main" id="{1CCF8380-D58D-409F-802C-39B7BCC472A7}"/>
+                <a16:creationId xmlns:a16="http://schemas.microsoft.com/office/drawing/2014/main" id="{296DA877-9218-4325-8A4C-BC6C0680B8CC}"/>
               </a:ext>
             </a:extLst>
           </p:cNvPr>
@@ -3978,12 +3980,12 @@
               </a:ext>
             </a:extLst>
           </a:blip>
-          <a:srcRect l="21833" r="21833"/>
+          <a:srcRect l="15484" r="28182"/>
           <a:stretch/>
         </p:blipFill>
         <p:spPr>
           <a:xfrm>
-            <a:off x="2876550" y="209550"/>
+            <a:off x="2702378" y="209550"/>
             <a:ext cx="6438900" cy="6438900"/>
           </a:xfrm>
           <a:prstGeom prst="ellipse">
@@ -3994,7 +3996,137 @@
     </p:spTree>
     <p:extLst>
       <p:ext uri="{BB962C8B-B14F-4D97-AF65-F5344CB8AC3E}">
-        <p14:creationId xmlns:p14="http://schemas.microsoft.com/office/powerpoint/2010/main" val="1264807898"/>
+        <p14:creationId xmlns:p14="http://schemas.microsoft.com/office/powerpoint/2010/main" val="461289751"/>
+      </p:ext>
+    </p:extLst>
+  </p:cSld>
+  <p:clrMapOvr>
+    <a:masterClrMapping/>
+  </p:clrMapOvr>
+</p:sld>
+</file>
+
+<file path=ppt/slides/slide7.xml><?xml version="1.0" encoding="utf-8"?>
+<p:sld xmlns:a="http://schemas.openxmlformats.org/drawingml/2006/main" xmlns:r="http://schemas.openxmlformats.org/officeDocument/2006/relationships" xmlns:p="http://schemas.openxmlformats.org/presentationml/2006/main">
+  <p:cSld>
+    <p:spTree>
+      <p:nvGrpSpPr>
+        <p:cNvPr id="1" name=""/>
+        <p:cNvGrpSpPr/>
+        <p:nvPr/>
+      </p:nvGrpSpPr>
+      <p:grpSpPr>
+        <a:xfrm>
+          <a:off x="0" y="0"/>
+          <a:ext cx="0" cy="0"/>
+          <a:chOff x="0" y="0"/>
+          <a:chExt cx="0" cy="0"/>
+        </a:xfrm>
+      </p:grpSpPr>
+      <p:pic>
+        <p:nvPicPr>
+          <p:cNvPr id="7" name="Picture 6">
+            <a:extLst>
+              <a:ext uri="{FF2B5EF4-FFF2-40B4-BE49-F238E27FC236}">
+                <a16:creationId xmlns:a16="http://schemas.microsoft.com/office/drawing/2014/main" id="{342C987B-5C87-4EFB-A6FA-11DA077F6A4B}"/>
+              </a:ext>
+            </a:extLst>
+          </p:cNvPr>
+          <p:cNvPicPr>
+            <a:picLocks noChangeAspect="1"/>
+          </p:cNvPicPr>
+          <p:nvPr/>
+        </p:nvPicPr>
+        <p:blipFill rotWithShape="1">
+          <a:blip r:embed="rId2">
+            <a:extLst>
+              <a:ext uri="{28A0092B-C50C-407E-A947-70E740481C1C}">
+                <a14:useLocalDpi xmlns:a14="http://schemas.microsoft.com/office/drawing/2010/main" val="0"/>
+              </a:ext>
+            </a:extLst>
+          </a:blip>
+          <a:srcRect l="5198" r="38468"/>
+          <a:stretch/>
+        </p:blipFill>
+        <p:spPr>
+          <a:xfrm>
+            <a:off x="2615293" y="209550"/>
+            <a:ext cx="6438900" cy="6438900"/>
+          </a:xfrm>
+          <a:prstGeom prst="ellipse">
+            <a:avLst/>
+          </a:prstGeom>
+        </p:spPr>
+      </p:pic>
+    </p:spTree>
+    <p:extLst>
+      <p:ext uri="{BB962C8B-B14F-4D97-AF65-F5344CB8AC3E}">
+        <p14:creationId xmlns:p14="http://schemas.microsoft.com/office/powerpoint/2010/main" val="4210855259"/>
+      </p:ext>
+    </p:extLst>
+  </p:cSld>
+  <p:clrMapOvr>
+    <a:masterClrMapping/>
+  </p:clrMapOvr>
+</p:sld>
+</file>
+
+<file path=ppt/slides/slide8.xml><?xml version="1.0" encoding="utf-8"?>
+<p:sld xmlns:a="http://schemas.openxmlformats.org/drawingml/2006/main" xmlns:r="http://schemas.openxmlformats.org/officeDocument/2006/relationships" xmlns:p="http://schemas.openxmlformats.org/presentationml/2006/main">
+  <p:cSld>
+    <p:spTree>
+      <p:nvGrpSpPr>
+        <p:cNvPr id="1" name=""/>
+        <p:cNvGrpSpPr/>
+        <p:nvPr/>
+      </p:nvGrpSpPr>
+      <p:grpSpPr>
+        <a:xfrm>
+          <a:off x="0" y="0"/>
+          <a:ext cx="0" cy="0"/>
+          <a:chOff x="0" y="0"/>
+          <a:chExt cx="0" cy="0"/>
+        </a:xfrm>
+      </p:grpSpPr>
+      <p:pic>
+        <p:nvPicPr>
+          <p:cNvPr id="5" name="Picture 4">
+            <a:extLst>
+              <a:ext uri="{FF2B5EF4-FFF2-40B4-BE49-F238E27FC236}">
+                <a16:creationId xmlns:a16="http://schemas.microsoft.com/office/drawing/2014/main" id="{9EE32C3B-1F9C-4EEF-B9BF-155F97A5B82C}"/>
+              </a:ext>
+            </a:extLst>
+          </p:cNvPr>
+          <p:cNvPicPr>
+            <a:picLocks noChangeAspect="1"/>
+          </p:cNvPicPr>
+          <p:nvPr/>
+        </p:nvPicPr>
+        <p:blipFill rotWithShape="1">
+          <a:blip r:embed="rId2">
+            <a:extLst>
+              <a:ext uri="{28A0092B-C50C-407E-A947-70E740481C1C}">
+                <a14:useLocalDpi xmlns:a14="http://schemas.microsoft.com/office/drawing/2010/main" val="0"/>
+              </a:ext>
+            </a:extLst>
+          </a:blip>
+          <a:srcRect l="27249" r="6085"/>
+          <a:stretch/>
+        </p:blipFill>
+        <p:spPr>
+          <a:xfrm>
+            <a:off x="2667000" y="0"/>
+            <a:ext cx="6858000" cy="6858000"/>
+          </a:xfrm>
+          <a:prstGeom prst="ellipse">
+            <a:avLst/>
+          </a:prstGeom>
+        </p:spPr>
+      </p:pic>
+    </p:spTree>
+    <p:extLst>
+      <p:ext uri="{BB962C8B-B14F-4D97-AF65-F5344CB8AC3E}">
+        <p14:creationId xmlns:p14="http://schemas.microsoft.com/office/powerpoint/2010/main" val="3885846449"/>
       </p:ext>
     </p:extLst>
   </p:cSld>

</xml_diff>

<commit_message>
adding ai images, uncompressed
</commit_message>
<xml_diff>
--- a/src/img/_drafts/draft.pptx
+++ b/src/img/_drafts/draft.pptx
@@ -13,6 +13,8 @@
     <p:sldId id="260" r:id="rId7"/>
     <p:sldId id="262" r:id="rId8"/>
     <p:sldId id="263" r:id="rId9"/>
+    <p:sldId id="264" r:id="rId10"/>
+    <p:sldId id="265" r:id="rId11"/>
   </p:sldIdLst>
   <p:sldSz cx="12192000" cy="6858000"/>
   <p:notesSz cx="6858000" cy="9144000"/>
@@ -3455,6 +3457,145 @@
 </p:sld>
 </file>
 
+<file path=ppt/slides/slide10.xml><?xml version="1.0" encoding="utf-8"?>
+<p:sld xmlns:a="http://schemas.openxmlformats.org/drawingml/2006/main" xmlns:r="http://schemas.openxmlformats.org/officeDocument/2006/relationships" xmlns:p="http://schemas.openxmlformats.org/presentationml/2006/main">
+  <p:cSld>
+    <p:spTree>
+      <p:nvGrpSpPr>
+        <p:cNvPr id="1" name=""/>
+        <p:cNvGrpSpPr/>
+        <p:nvPr/>
+      </p:nvGrpSpPr>
+      <p:grpSpPr>
+        <a:xfrm>
+          <a:off x="0" y="0"/>
+          <a:ext cx="0" cy="0"/>
+          <a:chOff x="0" y="0"/>
+          <a:chExt cx="0" cy="0"/>
+        </a:xfrm>
+      </p:grpSpPr>
+      <p:grpSp>
+        <p:nvGrpSpPr>
+          <p:cNvPr id="7" name="Group 6">
+            <a:extLst>
+              <a:ext uri="{FF2B5EF4-FFF2-40B4-BE49-F238E27FC236}">
+                <a16:creationId xmlns:a16="http://schemas.microsoft.com/office/drawing/2014/main" id="{C191D925-4C3A-4F49-A0B0-599EC447DED8}"/>
+              </a:ext>
+            </a:extLst>
+          </p:cNvPr>
+          <p:cNvGrpSpPr/>
+          <p:nvPr/>
+        </p:nvGrpSpPr>
+        <p:grpSpPr>
+          <a:xfrm>
+            <a:off x="1524000" y="-1143000"/>
+            <a:ext cx="9144000" cy="9144000"/>
+            <a:chOff x="1524000" y="-1143000"/>
+            <a:chExt cx="9144000" cy="9144000"/>
+          </a:xfrm>
+        </p:grpSpPr>
+        <p:sp>
+          <p:nvSpPr>
+            <p:cNvPr id="6" name="Oval 5">
+              <a:extLst>
+                <a:ext uri="{FF2B5EF4-FFF2-40B4-BE49-F238E27FC236}">
+                  <a16:creationId xmlns:a16="http://schemas.microsoft.com/office/drawing/2014/main" id="{DDF79B06-E810-4DD8-BD95-C1D2DA39A8F0}"/>
+                </a:ext>
+              </a:extLst>
+            </p:cNvPr>
+            <p:cNvSpPr/>
+            <p:nvPr/>
+          </p:nvSpPr>
+          <p:spPr>
+            <a:xfrm>
+              <a:off x="1524000" y="-1143000"/>
+              <a:ext cx="9144000" cy="9144000"/>
+            </a:xfrm>
+            <a:prstGeom prst="ellipse">
+              <a:avLst/>
+            </a:prstGeom>
+            <a:solidFill>
+              <a:srgbClr val="000000"/>
+            </a:solidFill>
+            <a:ln>
+              <a:noFill/>
+            </a:ln>
+          </p:spPr>
+          <p:style>
+            <a:lnRef idx="2">
+              <a:schemeClr val="accent1">
+                <a:shade val="50000"/>
+              </a:schemeClr>
+            </a:lnRef>
+            <a:fillRef idx="1">
+              <a:schemeClr val="accent1"/>
+            </a:fillRef>
+            <a:effectRef idx="0">
+              <a:schemeClr val="accent1"/>
+            </a:effectRef>
+            <a:fontRef idx="minor">
+              <a:schemeClr val="lt1"/>
+            </a:fontRef>
+          </p:style>
+          <p:txBody>
+            <a:bodyPr rtlCol="0" anchor="ctr"/>
+            <a:lstStyle/>
+            <a:p>
+              <a:pPr algn="ctr"/>
+              <a:endParaRPr lang="en-US"/>
+            </a:p>
+          </p:txBody>
+        </p:sp>
+        <p:pic>
+          <p:nvPicPr>
+            <p:cNvPr id="5" name="Picture 4">
+              <a:extLst>
+                <a:ext uri="{FF2B5EF4-FFF2-40B4-BE49-F238E27FC236}">
+                  <a16:creationId xmlns:a16="http://schemas.microsoft.com/office/drawing/2014/main" id="{9DF4D6FB-895D-4788-A5AE-6D4F544E89B8}"/>
+                </a:ext>
+              </a:extLst>
+            </p:cNvPr>
+            <p:cNvPicPr>
+              <a:picLocks noChangeAspect="1"/>
+            </p:cNvPicPr>
+            <p:nvPr/>
+          </p:nvPicPr>
+          <p:blipFill>
+            <a:blip r:embed="rId2">
+              <a:extLst>
+                <a:ext uri="{28A0092B-C50C-407E-A947-70E740481C1C}">
+                  <a14:useLocalDpi xmlns:a14="http://schemas.microsoft.com/office/drawing/2010/main" val="0"/>
+                </a:ext>
+              </a:extLst>
+            </a:blip>
+            <a:stretch>
+              <a:fillRect/>
+            </a:stretch>
+          </p:blipFill>
+          <p:spPr>
+            <a:xfrm>
+              <a:off x="2247900" y="129540"/>
+              <a:ext cx="7696200" cy="6598920"/>
+            </a:xfrm>
+            <a:prstGeom prst="rect">
+              <a:avLst/>
+            </a:prstGeom>
+          </p:spPr>
+        </p:pic>
+      </p:grpSp>
+    </p:spTree>
+    <p:extLst>
+      <p:ext uri="{BB962C8B-B14F-4D97-AF65-F5344CB8AC3E}">
+        <p14:creationId xmlns:p14="http://schemas.microsoft.com/office/powerpoint/2010/main" val="1350945587"/>
+      </p:ext>
+    </p:extLst>
+  </p:cSld>
+  <p:clrMapOvr>
+    <a:masterClrMapping/>
+  </p:clrMapOvr>
+</p:sld>
+</file>
+
 <file path=ppt/slides/slide2.xml><?xml version="1.0" encoding="utf-8"?>
 <p:sld xmlns:a="http://schemas.openxmlformats.org/drawingml/2006/main" xmlns:r="http://schemas.openxmlformats.org/officeDocument/2006/relationships" xmlns:p="http://schemas.openxmlformats.org/presentationml/2006/main">
   <p:cSld>
@@ -4127,6 +4268,71 @@
     <p:extLst>
       <p:ext uri="{BB962C8B-B14F-4D97-AF65-F5344CB8AC3E}">
         <p14:creationId xmlns:p14="http://schemas.microsoft.com/office/powerpoint/2010/main" val="3885846449"/>
+      </p:ext>
+    </p:extLst>
+  </p:cSld>
+  <p:clrMapOvr>
+    <a:masterClrMapping/>
+  </p:clrMapOvr>
+</p:sld>
+</file>
+
+<file path=ppt/slides/slide9.xml><?xml version="1.0" encoding="utf-8"?>
+<p:sld xmlns:a="http://schemas.openxmlformats.org/drawingml/2006/main" xmlns:r="http://schemas.openxmlformats.org/officeDocument/2006/relationships" xmlns:p="http://schemas.openxmlformats.org/presentationml/2006/main">
+  <p:cSld>
+    <p:spTree>
+      <p:nvGrpSpPr>
+        <p:cNvPr id="1" name=""/>
+        <p:cNvGrpSpPr/>
+        <p:nvPr/>
+      </p:nvGrpSpPr>
+      <p:grpSpPr>
+        <a:xfrm>
+          <a:off x="0" y="0"/>
+          <a:ext cx="0" cy="0"/>
+          <a:chOff x="0" y="0"/>
+          <a:chExt cx="0" cy="0"/>
+        </a:xfrm>
+      </p:grpSpPr>
+      <p:pic>
+        <p:nvPicPr>
+          <p:cNvPr id="5" name="Picture 4">
+            <a:extLst>
+              <a:ext uri="{FF2B5EF4-FFF2-40B4-BE49-F238E27FC236}">
+                <a16:creationId xmlns:a16="http://schemas.microsoft.com/office/drawing/2014/main" id="{28947B51-EF92-4099-80CA-6774E2B6B7A8}"/>
+              </a:ext>
+            </a:extLst>
+          </p:cNvPr>
+          <p:cNvPicPr>
+            <a:picLocks noChangeAspect="1"/>
+          </p:cNvPicPr>
+          <p:nvPr/>
+        </p:nvPicPr>
+        <p:blipFill rotWithShape="1">
+          <a:blip r:embed="rId2">
+            <a:extLst>
+              <a:ext uri="{28A0092B-C50C-407E-A947-70E740481C1C}">
+                <a14:useLocalDpi xmlns:a14="http://schemas.microsoft.com/office/drawing/2010/main" val="0"/>
+              </a:ext>
+            </a:extLst>
+          </a:blip>
+          <a:srcRect l="8960" r="32145"/>
+          <a:stretch/>
+        </p:blipFill>
+        <p:spPr>
+          <a:xfrm>
+            <a:off x="2666999" y="0"/>
+            <a:ext cx="6858000" cy="6858000"/>
+          </a:xfrm>
+          <a:prstGeom prst="rect">
+            <a:avLst/>
+          </a:prstGeom>
+        </p:spPr>
+      </p:pic>
+    </p:spTree>
+    <p:extLst>
+      <p:ext uri="{BB962C8B-B14F-4D97-AF65-F5344CB8AC3E}">
+        <p14:creationId xmlns:p14="http://schemas.microsoft.com/office/powerpoint/2010/main" val="1483593295"/>
       </p:ext>
     </p:extLst>
   </p:cSld>

</xml_diff>